<commit_message>
add forum essentials qr-tag. add chademo plug
</commit_message>
<xml_diff>
--- a/tesla_model_s_handout_ch.pptx
+++ b/tesla_model_s_handout_ch.pptx
@@ -3481,8 +3481,11 @@
                   </a:outerShdw>
                 </a:effectLst>
               </a:rPr>
-              <a:t>Version </a:t>
-            </a:r>
+              <a:t>Version 1.5</a:t>
+            </a:r>
+          </a:p>
+          <a:p>
+            <a:pPr algn="r"/>
             <a:r>
               <a:rPr lang="de-CH" sz="1200" b="1" dirty="0" smtClean="0">
                 <a:ln w="18415" cmpd="sng">
@@ -3500,64 +3503,7 @@
                   </a:outerShdw>
                 </a:effectLst>
               </a:rPr>
-              <a:t>1.5</a:t>
-            </a:r>
-            <a:endParaRPr lang="de-CH" sz="1200" b="1" dirty="0" smtClean="0">
-              <a:ln w="18415" cmpd="sng">
-                <a:noFill/>
-                <a:prstDash val="solid"/>
-              </a:ln>
-              <a:solidFill>
-                <a:srgbClr val="FFFFFF"/>
-              </a:solidFill>
-              <a:effectLst>
-                <a:outerShdw blurRad="38100" dist="38100" dir="2700000" algn="tl">
-                  <a:srgbClr val="000000">
-                    <a:alpha val="43137"/>
-                  </a:srgbClr>
-                </a:outerShdw>
-              </a:effectLst>
-            </a:endParaRPr>
-          </a:p>
-          <a:p>
-            <a:pPr algn="r"/>
-            <a:r>
-              <a:rPr lang="de-CH" sz="1200" b="1" dirty="0" smtClean="0">
-                <a:ln w="18415" cmpd="sng">
-                  <a:noFill/>
-                  <a:prstDash val="solid"/>
-                </a:ln>
-                <a:solidFill>
-                  <a:srgbClr val="FFFFFF"/>
-                </a:solidFill>
-                <a:effectLst>
-                  <a:outerShdw blurRad="38100" dist="38100" dir="2700000" algn="tl">
-                    <a:srgbClr val="000000">
-                      <a:alpha val="43137"/>
-                    </a:srgbClr>
-                  </a:outerShdw>
-                </a:effectLst>
-              </a:rPr>
-              <a:t>CH </a:t>
-            </a:r>
-            <a:r>
-              <a:rPr lang="de-CH" sz="1200" b="1" dirty="0" smtClean="0">
-                <a:ln w="18415" cmpd="sng">
-                  <a:noFill/>
-                  <a:prstDash val="solid"/>
-                </a:ln>
-                <a:solidFill>
-                  <a:srgbClr val="FFFFFF"/>
-                </a:solidFill>
-                <a:effectLst>
-                  <a:outerShdw blurRad="38100" dist="38100" dir="2700000" algn="tl">
-                    <a:srgbClr val="000000">
-                      <a:alpha val="43137"/>
-                    </a:srgbClr>
-                  </a:outerShdw>
-                </a:effectLst>
-              </a:rPr>
-              <a:t>Edition</a:t>
+              <a:t>CH Edition</a:t>
             </a:r>
           </a:p>
         </p:txBody>
@@ -4872,6 +4818,45 @@
           <a:chExt cx="0" cy="0"/>
         </a:xfrm>
       </p:grpSpPr>
+      <p:pic>
+        <p:nvPicPr>
+          <p:cNvPr id="2055" name="Picture 7" descr="http://insideevs.com/wp-content/uploads/2015/02/tesla-supercharger-europe.jpg"/>
+          <p:cNvPicPr>
+            <a:picLocks noChangeAspect="1" noChangeArrowheads="1"/>
+          </p:cNvPicPr>
+          <p:nvPr/>
+        </p:nvPicPr>
+        <p:blipFill rotWithShape="1">
+          <a:blip r:embed="rId2" cstate="print">
+            <a:extLst>
+              <a:ext uri="{28A0092B-C50C-407E-A947-70E740481C1C}">
+                <a14:useLocalDpi xmlns:a14="http://schemas.microsoft.com/office/drawing/2010/main"/>
+              </a:ext>
+            </a:extLst>
+          </a:blip>
+          <a:srcRect t="-1465" b="3120"/>
+          <a:stretch/>
+        </p:blipFill>
+        <p:spPr bwMode="auto">
+          <a:xfrm>
+            <a:off x="-10549" y="-47625"/>
+            <a:ext cx="6308483" cy="4135025"/>
+          </a:xfrm>
+          <a:prstGeom prst="rect">
+            <a:avLst/>
+          </a:prstGeom>
+          <a:noFill/>
+          <a:extLst>
+            <a:ext uri="{909E8E84-426E-40DD-AFC4-6F175D3DCCD1}">
+              <a14:hiddenFill xmlns:a14="http://schemas.microsoft.com/office/drawing/2010/main">
+                <a:solidFill>
+                  <a:srgbClr val="FFFFFF"/>
+                </a:solidFill>
+              </a14:hiddenFill>
+            </a:ext>
+          </a:extLst>
+        </p:spPr>
+      </p:pic>
       <p:sp>
         <p:nvSpPr>
           <p:cNvPr id="3" name="Rechteck 2"/>
@@ -4880,8 +4865,8 @@
         </p:nvSpPr>
         <p:spPr>
           <a:xfrm>
-            <a:off x="6447585" y="7620"/>
-            <a:ext cx="3458548" cy="3988308"/>
+            <a:off x="5819775" y="7620"/>
+            <a:ext cx="4086358" cy="4079780"/>
           </a:xfrm>
           <a:prstGeom prst="rect">
             <a:avLst/>
@@ -4930,14 +4915,14 @@
           <p:nvPr>
             <p:extLst>
               <p:ext uri="{D42A27DB-BD31-4B8C-83A1-F6EECF244321}">
-                <p14:modId xmlns:p14="http://schemas.microsoft.com/office/powerpoint/2010/main" val="3649754893"/>
+                <p14:modId xmlns:p14="http://schemas.microsoft.com/office/powerpoint/2010/main" val="1081554318"/>
               </p:ext>
             </p:extLst>
           </p:nvPr>
         </p:nvGraphicFramePr>
         <p:xfrm>
-          <a:off x="6465764" y="3025490"/>
-          <a:ext cx="3374290" cy="962760"/>
+          <a:off x="5819775" y="3139880"/>
+          <a:ext cx="4086357" cy="962760"/>
         </p:xfrm>
         <a:graphic>
           <a:graphicData uri="http://schemas.openxmlformats.org/drawingml/2006/table">
@@ -4946,12 +4931,13 @@
                 <a:tableStyleId>{5C22544A-7EE6-4342-B048-85BDC9FD1C3A}</a:tableStyleId>
               </a:tblPr>
               <a:tblGrid>
-                <a:gridCol w="428785"/>
-                <a:gridCol w="573051"/>
-                <a:gridCol w="581025"/>
-                <a:gridCol w="571500"/>
-                <a:gridCol w="581025"/>
-                <a:gridCol w="638904"/>
+                <a:gridCol w="645033"/>
+                <a:gridCol w="576072"/>
+                <a:gridCol w="539496"/>
+                <a:gridCol w="557784"/>
+                <a:gridCol w="557784"/>
+                <a:gridCol w="530352"/>
+                <a:gridCol w="679836"/>
               </a:tblGrid>
               <a:tr h="0">
                 <a:tc>
@@ -5225,7 +5211,7 @@
                             <a:schemeClr val="tx1"/>
                           </a:solidFill>
                         </a:rPr>
-                        <a:t>Supercharger</a:t>
+                        <a:t>Chademo</a:t>
                       </a:r>
                       <a:endParaRPr lang="en-US" sz="700" dirty="0">
                         <a:solidFill>
@@ -5266,8 +5252,6 @@
                     <a:noFill/>
                   </a:tcPr>
                 </a:tc>
-              </a:tr>
-              <a:tr h="0">
                 <a:tc>
                   <a:txBody>
                     <a:bodyPr/>
@@ -5279,7 +5263,61 @@
                             <a:schemeClr val="tx1"/>
                           </a:solidFill>
                         </a:rPr>
-                        <a:t>Instal-lation</a:t>
+                        <a:t>Supercharger</a:t>
+                      </a:r>
+                      <a:endParaRPr lang="en-US" sz="700" dirty="0">
+                        <a:solidFill>
+                          <a:schemeClr val="tx1"/>
+                        </a:solidFill>
+                      </a:endParaRPr>
+                    </a:p>
+                  </a:txBody>
+                  <a:tcPr marL="36000" marR="0" marT="0" marB="72000">
+                    <a:lnL w="12700" cmpd="sng">
+                      <a:noFill/>
+                    </a:lnL>
+                    <a:lnR w="12700" cmpd="sng">
+                      <a:noFill/>
+                    </a:lnR>
+                    <a:lnT w="12700" cmpd="sng">
+                      <a:noFill/>
+                    </a:lnT>
+                    <a:lnB w="12700" cap="flat" cmpd="sng" algn="ctr">
+                      <a:solidFill>
+                        <a:schemeClr val="bg1">
+                          <a:lumMod val="50000"/>
+                        </a:schemeClr>
+                      </a:solidFill>
+                      <a:prstDash val="solid"/>
+                      <a:round/>
+                      <a:headEnd type="none" w="med" len="med"/>
+                      <a:tailEnd type="none" w="med" len="med"/>
+                    </a:lnB>
+                    <a:lnTlToBr w="12700" cmpd="sng">
+                      <a:noFill/>
+                      <a:prstDash val="solid"/>
+                    </a:lnTlToBr>
+                    <a:lnBlToTr w="12700" cmpd="sng">
+                      <a:noFill/>
+                      <a:prstDash val="solid"/>
+                    </a:lnBlToTr>
+                    <a:noFill/>
+                  </a:tcPr>
+                </a:tc>
+              </a:tr>
+              <a:tr h="0">
+                <a:tc>
+                  <a:txBody>
+                    <a:bodyPr/>
+                    <a:lstStyle/>
+                    <a:p>
+                      <a:r>
+                        <a:rPr lang="de-CH" sz="700" dirty="0" smtClean="0">
+                          <a:solidFill>
+                            <a:schemeClr val="tx1"/>
+                          </a:solidFill>
+                        </a:rPr>
+                        <a:t>Installation</a:t>
                       </a:r>
                       <a:endParaRPr lang="en-US" sz="700" dirty="0">
                         <a:solidFill>
@@ -5399,7 +5437,7 @@
                             <a:schemeClr val="tx1"/>
                           </a:solidFill>
                         </a:rPr>
-                        <a:t>500</a:t>
+                        <a:t>400</a:t>
                       </a:r>
                       <a:r>
                         <a:rPr lang="de-CH" sz="700" baseline="0" dirty="0" smtClean="0">
@@ -5407,7 +5445,15 @@
                             <a:schemeClr val="tx1"/>
                           </a:solidFill>
                         </a:rPr>
-                        <a:t> - 1500 </a:t>
+                        <a:t> </a:t>
+                      </a:r>
+                      <a:r>
+                        <a:rPr lang="de-CH" sz="700" baseline="0" dirty="0" smtClean="0">
+                          <a:solidFill>
+                            <a:schemeClr val="tx1"/>
+                          </a:solidFill>
+                        </a:rPr>
+                        <a:t>- 1500 </a:t>
                       </a:r>
                       <a:br>
                         <a:rPr lang="de-CH" sz="700" baseline="0" dirty="0" smtClean="0">
@@ -5602,15 +5648,17 @@
                             <a:schemeClr val="tx1"/>
                           </a:solidFill>
                         </a:rPr>
-                        <a:t>(im Auto-Kaufpreis</a:t>
+                        <a:t>über 20’000</a:t>
                       </a:r>
+                    </a:p>
+                    <a:p>
                       <a:r>
-                        <a:rPr lang="de-CH" sz="700" baseline="0" dirty="0" smtClean="0">
+                        <a:rPr lang="de-CH" sz="700" dirty="0" smtClean="0">
                           <a:solidFill>
                             <a:schemeClr val="tx1"/>
                           </a:solidFill>
                         </a:rPr>
-                        <a:t> inklusive)</a:t>
+                        <a:t>CHF</a:t>
                       </a:r>
                       <a:endParaRPr lang="en-US" sz="700" dirty="0">
                         <a:solidFill>
@@ -5659,6 +5707,82 @@
                     <a:noFill/>
                   </a:tcPr>
                 </a:tc>
+                <a:tc>
+                  <a:txBody>
+                    <a:bodyPr/>
+                    <a:lstStyle/>
+                    <a:p>
+                      <a:r>
+                        <a:rPr lang="de-CH" sz="700" dirty="0" smtClean="0">
+                          <a:solidFill>
+                            <a:schemeClr val="tx1"/>
+                          </a:solidFill>
+                        </a:rPr>
+                        <a:t>(</a:t>
+                      </a:r>
+                      <a:r>
+                        <a:rPr lang="de-CH" sz="700" dirty="0" smtClean="0">
+                          <a:solidFill>
+                            <a:schemeClr val="tx1"/>
+                          </a:solidFill>
+                        </a:rPr>
+                        <a:t>im Auto-Kaufpreis</a:t>
+                      </a:r>
+                      <a:r>
+                        <a:rPr lang="de-CH" sz="700" baseline="0" dirty="0" smtClean="0">
+                          <a:solidFill>
+                            <a:schemeClr val="tx1"/>
+                          </a:solidFill>
+                        </a:rPr>
+                        <a:t> inklusive)</a:t>
+                      </a:r>
+                      <a:endParaRPr lang="en-US" sz="700" dirty="0">
+                        <a:solidFill>
+                          <a:schemeClr val="tx1"/>
+                        </a:solidFill>
+                      </a:endParaRPr>
+                    </a:p>
+                  </a:txBody>
+                  <a:tcPr marL="36000" marR="0" marT="0" marB="72000">
+                    <a:lnL w="12700" cmpd="sng">
+                      <a:noFill/>
+                    </a:lnL>
+                    <a:lnR w="12700" cmpd="sng">
+                      <a:noFill/>
+                    </a:lnR>
+                    <a:lnT w="12700" cap="flat" cmpd="sng" algn="ctr">
+                      <a:solidFill>
+                        <a:schemeClr val="bg1">
+                          <a:lumMod val="50000"/>
+                        </a:schemeClr>
+                      </a:solidFill>
+                      <a:prstDash val="solid"/>
+                      <a:round/>
+                      <a:headEnd type="none" w="med" len="med"/>
+                      <a:tailEnd type="none" w="med" len="med"/>
+                    </a:lnT>
+                    <a:lnB w="12700" cap="flat" cmpd="sng" algn="ctr">
+                      <a:solidFill>
+                        <a:schemeClr val="bg1">
+                          <a:lumMod val="50000"/>
+                        </a:schemeClr>
+                      </a:solidFill>
+                      <a:prstDash val="solid"/>
+                      <a:round/>
+                      <a:headEnd type="none" w="med" len="med"/>
+                      <a:tailEnd type="none" w="med" len="med"/>
+                    </a:lnB>
+                    <a:lnTlToBr w="12700" cmpd="sng">
+                      <a:noFill/>
+                      <a:prstDash val="solid"/>
+                    </a:lnTlToBr>
+                    <a:lnBlToTr w="12700" cmpd="sng">
+                      <a:noFill/>
+                      <a:prstDash val="solid"/>
+                    </a:lnBlToTr>
+                    <a:noFill/>
+                  </a:tcPr>
+                </a:tc>
               </a:tr>
               <a:tr h="111957">
                 <a:tc>
@@ -5672,7 +5796,7 @@
                             <a:schemeClr val="tx1"/>
                           </a:solidFill>
                         </a:rPr>
-                        <a:t>Strom-bezug</a:t>
+                        <a:t>Strombezug</a:t>
                       </a:r>
                       <a:endParaRPr lang="en-US" sz="700" dirty="0">
                         <a:solidFill>
@@ -5914,6 +6038,58 @@
                         </a:rPr>
                         <a:t>oft gratis oder Parkgebühr</a:t>
                       </a:r>
+                      <a:endParaRPr lang="en-US" sz="700" dirty="0">
+                        <a:solidFill>
+                          <a:schemeClr val="tx1"/>
+                        </a:solidFill>
+                      </a:endParaRPr>
+                    </a:p>
+                  </a:txBody>
+                  <a:tcPr marL="36000" marR="0" marT="0" marB="72000">
+                    <a:lnL w="12700" cmpd="sng">
+                      <a:noFill/>
+                    </a:lnL>
+                    <a:lnR w="12700" cmpd="sng">
+                      <a:noFill/>
+                    </a:lnR>
+                    <a:lnT w="12700" cap="flat" cmpd="sng" algn="ctr">
+                      <a:solidFill>
+                        <a:schemeClr val="bg1">
+                          <a:lumMod val="50000"/>
+                        </a:schemeClr>
+                      </a:solidFill>
+                      <a:prstDash val="solid"/>
+                      <a:round/>
+                      <a:headEnd type="none" w="med" len="med"/>
+                      <a:tailEnd type="none" w="med" len="med"/>
+                    </a:lnT>
+                    <a:lnB w="12700" cap="flat" cmpd="sng" algn="ctr">
+                      <a:solidFill>
+                        <a:schemeClr val="bg1">
+                          <a:lumMod val="50000"/>
+                        </a:schemeClr>
+                      </a:solidFill>
+                      <a:prstDash val="solid"/>
+                      <a:round/>
+                      <a:headEnd type="none" w="med" len="med"/>
+                      <a:tailEnd type="none" w="med" len="med"/>
+                    </a:lnB>
+                    <a:lnTlToBr w="12700" cmpd="sng">
+                      <a:noFill/>
+                      <a:prstDash val="solid"/>
+                    </a:lnTlToBr>
+                    <a:lnBlToTr w="12700" cmpd="sng">
+                      <a:noFill/>
+                      <a:prstDash val="solid"/>
+                    </a:lnBlToTr>
+                    <a:noFill/>
+                  </a:tcPr>
+                </a:tc>
+                <a:tc>
+                  <a:txBody>
+                    <a:bodyPr/>
+                    <a:lstStyle/>
+                    <a:p>
                       <a:endParaRPr lang="en-US" sz="700" dirty="0">
                         <a:solidFill>
                           <a:schemeClr val="tx1"/>
@@ -6036,29 +6212,27 @@
       </p:graphicFrame>
       <p:pic>
         <p:nvPicPr>
-          <p:cNvPr id="1026" name="Picture 2"/>
+          <p:cNvPr id="4" name="Picture 2"/>
           <p:cNvPicPr>
             <a:picLocks noChangeAspect="1" noChangeArrowheads="1"/>
           </p:cNvPicPr>
           <p:nvPr/>
         </p:nvPicPr>
-        <p:blipFill>
-          <a:blip r:embed="rId2">
+        <p:blipFill rotWithShape="1">
+          <a:blip r:embed="rId3">
             <a:extLst>
               <a:ext uri="{28A0092B-C50C-407E-A947-70E740481C1C}">
                 <a14:useLocalDpi xmlns:a14="http://schemas.microsoft.com/office/drawing/2010/main" val="0"/>
               </a:ext>
             </a:extLst>
           </a:blip>
-          <a:srcRect/>
-          <a:stretch>
-            <a:fillRect/>
-          </a:stretch>
+          <a:srcRect b="2547"/>
+          <a:stretch/>
         </p:blipFill>
         <p:spPr bwMode="auto">
           <a:xfrm>
-            <a:off x="6470552" y="321227"/>
-            <a:ext cx="3364975" cy="2862384"/>
+            <a:off x="6007608" y="75495"/>
+            <a:ext cx="3845928" cy="3216346"/>
           </a:xfrm>
           <a:prstGeom prst="rect">
             <a:avLst/>
@@ -6097,7 +6271,7 @@
           <p:nvPr/>
         </p:nvPicPr>
         <p:blipFill>
-          <a:blip r:embed="rId3">
+          <a:blip r:embed="rId4">
             <a:extLst>
               <a:ext uri="{28A0092B-C50C-407E-A947-70E740481C1C}">
                 <a14:useLocalDpi xmlns:a14="http://schemas.microsoft.com/office/drawing/2010/main" val="0"/>
@@ -6111,7 +6285,7 @@
         </p:blipFill>
         <p:spPr bwMode="auto">
           <a:xfrm>
-            <a:off x="6496841" y="4309143"/>
+            <a:off x="6499554" y="4336092"/>
             <a:ext cx="3393550" cy="2263702"/>
           </a:xfrm>
           <a:prstGeom prst="rect">
@@ -6142,45 +6316,6 @@
           </a:extLst>
         </p:spPr>
       </p:pic>
-      <p:pic>
-        <p:nvPicPr>
-          <p:cNvPr id="2055" name="Picture 7" descr="http://insideevs.com/wp-content/uploads/2015/02/tesla-supercharger-europe.jpg"/>
-          <p:cNvPicPr>
-            <a:picLocks noChangeAspect="1" noChangeArrowheads="1"/>
-          </p:cNvPicPr>
-          <p:nvPr/>
-        </p:nvPicPr>
-        <p:blipFill rotWithShape="1">
-          <a:blip r:embed="rId4" cstate="print">
-            <a:extLst>
-              <a:ext uri="{28A0092B-C50C-407E-A947-70E740481C1C}">
-                <a14:useLocalDpi xmlns:a14="http://schemas.microsoft.com/office/drawing/2010/main"/>
-              </a:ext>
-            </a:extLst>
-          </a:blip>
-          <a:srcRect t="-1465"/>
-          <a:stretch/>
-        </p:blipFill>
-        <p:spPr bwMode="auto">
-          <a:xfrm>
-            <a:off x="-10549" y="-47625"/>
-            <a:ext cx="6308483" cy="4266197"/>
-          </a:xfrm>
-          <a:prstGeom prst="rect">
-            <a:avLst/>
-          </a:prstGeom>
-          <a:noFill/>
-          <a:extLst>
-            <a:ext uri="{909E8E84-426E-40DD-AFC4-6F175D3DCCD1}">
-              <a14:hiddenFill xmlns:a14="http://schemas.microsoft.com/office/drawing/2010/main">
-                <a:solidFill>
-                  <a:srgbClr val="FFFFFF"/>
-                </a:solidFill>
-              </a14:hiddenFill>
-            </a:ext>
-          </a:extLst>
-        </p:spPr>
-      </p:pic>
       <p:sp>
         <p:nvSpPr>
           <p:cNvPr id="11" name="TextBox 10"/>
@@ -6189,8 +6324,8 @@
         </p:nvSpPr>
         <p:spPr>
           <a:xfrm>
-            <a:off x="7790789" y="500054"/>
-            <a:ext cx="1712172" cy="338554"/>
+            <a:off x="7790789" y="289742"/>
+            <a:ext cx="1712172" cy="400110"/>
           </a:xfrm>
           <a:prstGeom prst="rect">
             <a:avLst/>
@@ -6213,9 +6348,12 @@
           <a:lstStyle/>
           <a:p>
             <a:r>
-              <a:rPr lang="de-DE" sz="800" i="1" dirty="0" smtClean="0">
-                <a:solidFill>
-                  <a:srgbClr val="800000"/>
+              <a:rPr lang="de-DE" sz="1000" i="1" dirty="0" smtClean="0">
+                <a:solidFill>
+                  <a:schemeClr val="tx1">
+                    <a:lumMod val="65000"/>
+                    <a:lumOff val="35000"/>
+                  </a:schemeClr>
                 </a:solidFill>
               </a:rPr>
               <a:t>Wie lange dauert es, </a:t>
@@ -6223,16 +6361,33 @@
           </a:p>
           <a:p>
             <a:r>
-              <a:rPr lang="de-DE" sz="800" i="1" dirty="0" smtClean="0">
-                <a:solidFill>
-                  <a:srgbClr val="800000"/>
+              <a:rPr lang="de-DE" sz="1000" b="1" i="1" dirty="0" smtClean="0">
+                <a:solidFill>
+                  <a:schemeClr val="tx1">
+                    <a:lumMod val="65000"/>
+                    <a:lumOff val="35000"/>
+                  </a:schemeClr>
                 </a:solidFill>
               </a:rPr>
-              <a:t>100km Reichweite zu laden?</a:t>
-            </a:r>
-            <a:endParaRPr lang="de-DE" sz="800" i="1" dirty="0">
+              <a:t>100km Reichweite </a:t>
+            </a:r>
+            <a:r>
+              <a:rPr lang="de-DE" sz="1000" i="1" dirty="0" smtClean="0">
+                <a:solidFill>
+                  <a:schemeClr val="tx1">
+                    <a:lumMod val="65000"/>
+                    <a:lumOff val="35000"/>
+                  </a:schemeClr>
+                </a:solidFill>
+              </a:rPr>
+              <a:t>zu laden?</a:t>
+            </a:r>
+            <a:endParaRPr lang="de-DE" sz="1000" i="1" dirty="0">
               <a:solidFill>
-                <a:srgbClr val="800000"/>
+                <a:schemeClr val="tx1">
+                  <a:lumMod val="65000"/>
+                  <a:lumOff val="35000"/>
+                </a:schemeClr>
               </a:solidFill>
             </a:endParaRPr>
           </a:p>
@@ -6261,7 +6416,7 @@
         </p:blipFill>
         <p:spPr bwMode="auto">
           <a:xfrm>
-            <a:off x="101865" y="6466499"/>
+            <a:off x="101865" y="6504599"/>
             <a:ext cx="908050" cy="295275"/>
           </a:xfrm>
           <a:prstGeom prst="rect">
@@ -6287,8 +6442,8 @@
         </p:nvSpPr>
         <p:spPr>
           <a:xfrm>
-            <a:off x="985680" y="6449567"/>
-            <a:ext cx="6120586" cy="338554"/>
+            <a:off x="985679" y="6382892"/>
+            <a:ext cx="4834096" cy="461665"/>
           </a:xfrm>
           <a:prstGeom prst="rect">
             <a:avLst/>
@@ -6296,7 +6451,7 @@
           <a:noFill/>
         </p:spPr>
         <p:txBody>
-          <a:bodyPr wrap="none" rtlCol="0">
+          <a:bodyPr wrap="square" rtlCol="0">
             <a:spAutoFit/>
           </a:bodyPr>
           <a:lstStyle/>
@@ -6651,7 +6806,7 @@
               <a:t>  </a:t>
             </a:r>
             <a:r>
-              <a:rPr lang="de-CH" sz="800" i="1" smtClean="0">
+              <a:rPr lang="de-CH" sz="800" i="1" dirty="0" smtClean="0">
                 <a:solidFill>
                   <a:schemeClr val="bg1">
                     <a:lumMod val="50000"/>
@@ -6662,7 +6817,7 @@
               <a:t>www.goingelectric.de</a:t>
             </a:r>
             <a:r>
-              <a:rPr lang="de-CH" sz="800" i="1" smtClean="0">
+              <a:rPr lang="de-CH" sz="800" i="1" dirty="0" smtClean="0">
                 <a:solidFill>
                   <a:schemeClr val="bg1">
                     <a:lumMod val="50000"/>
@@ -6672,7 +6827,7 @@
               <a:t>  </a:t>
             </a:r>
             <a:r>
-              <a:rPr lang="de-CH" sz="800" i="1" smtClean="0">
+              <a:rPr lang="de-CH" sz="800" i="1" dirty="0" smtClean="0">
                 <a:solidFill>
                   <a:schemeClr val="bg1">
                     <a:lumMod val="50000"/>
@@ -6683,7 +6838,7 @@
               <a:t>www.e-driver.net</a:t>
             </a:r>
             <a:r>
-              <a:rPr lang="de-CH" sz="800" i="1" smtClean="0">
+              <a:rPr lang="de-CH" sz="800" i="1" dirty="0" smtClean="0">
                 <a:solidFill>
                   <a:schemeClr val="bg1">
                     <a:lumMod val="50000"/>
@@ -6710,8 +6865,8 @@
         </p:nvSpPr>
         <p:spPr>
           <a:xfrm>
-            <a:off x="0" y="6201060"/>
-            <a:ext cx="2303836" cy="307777"/>
+            <a:off x="0" y="6124860"/>
+            <a:ext cx="2303836" cy="415498"/>
           </a:xfrm>
           <a:prstGeom prst="rect">
             <a:avLst/>
@@ -6832,6 +6987,15 @@
                 </a:solidFill>
               </a:rPr>
             </a:br>
+            <a:endParaRPr lang="en-US" sz="700" i="1" dirty="0" smtClean="0">
+              <a:solidFill>
+                <a:schemeClr val="bg1">
+                  <a:lumMod val="50000"/>
+                </a:schemeClr>
+              </a:solidFill>
+            </a:endParaRPr>
+          </a:p>
+          <a:p>
             <a:r>
               <a:rPr lang="en-US" sz="700" i="1" dirty="0" smtClean="0">
                 <a:solidFill>
@@ -6840,7 +7004,17 @@
                   </a:schemeClr>
                 </a:solidFill>
               </a:rPr>
-              <a:t>Handout:</a:t>
+              <a:t>Handout</a:t>
+            </a:r>
+            <a:r>
+              <a:rPr lang="en-US" sz="700" i="1" dirty="0" smtClean="0">
+                <a:solidFill>
+                  <a:schemeClr val="bg1">
+                    <a:lumMod val="50000"/>
+                  </a:schemeClr>
+                </a:solidFill>
+              </a:rPr>
+              <a:t>:</a:t>
             </a:r>
             <a:endParaRPr lang="en-US" sz="700" dirty="0"/>
           </a:p>
@@ -6854,7 +7028,7 @@
         </p:nvSpPr>
         <p:spPr>
           <a:xfrm>
-            <a:off x="6446715" y="25908"/>
+            <a:off x="5819775" y="25908"/>
             <a:ext cx="747100" cy="169277"/>
           </a:xfrm>
           <a:prstGeom prst="rect">
@@ -6888,7 +7062,7 @@
         </p:nvSpPr>
         <p:spPr>
           <a:xfrm>
-            <a:off x="6447585" y="4087400"/>
+            <a:off x="5819775" y="4153727"/>
             <a:ext cx="888165" cy="169277"/>
           </a:xfrm>
           <a:prstGeom prst="rect">
@@ -6922,7 +7096,7 @@
         </p:nvSpPr>
         <p:spPr>
           <a:xfrm>
-            <a:off x="-4891" y="4400098"/>
+            <a:off x="-4891" y="4153726"/>
             <a:ext cx="971521" cy="169277"/>
           </a:xfrm>
           <a:prstGeom prst="rect">
@@ -7005,7 +7179,7 @@
         </p:blipFill>
         <p:spPr bwMode="auto">
           <a:xfrm>
-            <a:off x="2303836" y="716525"/>
+            <a:off x="1825676" y="716525"/>
             <a:ext cx="3994099" cy="1866401"/>
           </a:xfrm>
           <a:prstGeom prst="rect">
@@ -7057,8 +7231,8 @@
         </p:blipFill>
         <p:spPr>
           <a:xfrm>
-            <a:off x="0" y="4605794"/>
-            <a:ext cx="6384200" cy="1579915"/>
+            <a:off x="-4039" y="4432058"/>
+            <a:ext cx="6116275" cy="1513611"/>
           </a:xfrm>
           <a:prstGeom prst="rect">
             <a:avLst/>
@@ -7073,7 +7247,7 @@
         </p:nvSpPr>
         <p:spPr>
           <a:xfrm>
-            <a:off x="5819775" y="4513311"/>
+            <a:off x="5519236" y="4331955"/>
             <a:ext cx="593000" cy="200205"/>
           </a:xfrm>
           <a:prstGeom prst="rect">
@@ -7110,7 +7284,102 @@
           </a:p>
         </p:txBody>
       </p:sp>
+      <p:pic>
+        <p:nvPicPr>
+          <p:cNvPr id="1028" name="Picture 4"/>
+          <p:cNvPicPr>
+            <a:picLocks noChangeAspect="1" noChangeArrowheads="1"/>
+          </p:cNvPicPr>
+          <p:nvPr/>
+        </p:nvPicPr>
+        <p:blipFill>
+          <a:blip r:embed="rId14">
+            <a:extLst>
+              <a:ext uri="{28A0092B-C50C-407E-A947-70E740481C1C}">
+                <a14:useLocalDpi xmlns:a14="http://schemas.microsoft.com/office/drawing/2010/main" val="0"/>
+              </a:ext>
+            </a:extLst>
+          </a:blip>
+          <a:srcRect/>
+          <a:stretch>
+            <a:fillRect/>
+          </a:stretch>
+        </p:blipFill>
+        <p:spPr bwMode="auto">
+          <a:xfrm>
+            <a:off x="5804229" y="5953125"/>
+            <a:ext cx="857250" cy="857250"/>
+          </a:xfrm>
+          <a:prstGeom prst="rect">
+            <a:avLst/>
+          </a:prstGeom>
+          <a:noFill/>
+          <a:ln>
+            <a:noFill/>
+          </a:ln>
+          <a:extLst>
+            <a:ext uri="{909E8E84-426E-40DD-AFC4-6F175D3DCCD1}">
+              <a14:hiddenFill xmlns:a14="http://schemas.microsoft.com/office/drawing/2010/main">
+                <a:solidFill>
+                  <a:schemeClr val="accent1"/>
+                </a:solidFill>
+              </a14:hiddenFill>
+            </a:ext>
+            <a:ext uri="{91240B29-F687-4F45-9708-019B960494DF}">
+              <a14:hiddenLine xmlns:a14="http://schemas.microsoft.com/office/drawing/2010/main" w="9525">
+                <a:solidFill>
+                  <a:schemeClr val="tx1"/>
+                </a:solidFill>
+                <a:miter lim="800000"/>
+                <a:headEnd/>
+                <a:tailEnd/>
+              </a14:hiddenLine>
+            </a:ext>
+          </a:extLst>
+        </p:spPr>
+      </p:pic>
+      <p:sp>
+        <p:nvSpPr>
+          <p:cNvPr id="6" name="Textfeld 5"/>
+          <p:cNvSpPr txBox="1"/>
+          <p:nvPr/>
+        </p:nvSpPr>
+        <p:spPr>
+          <a:xfrm>
+            <a:off x="4016631" y="6044969"/>
+            <a:ext cx="1819729" cy="261610"/>
+          </a:xfrm>
+          <a:prstGeom prst="rect">
+            <a:avLst/>
+          </a:prstGeom>
+          <a:noFill/>
+        </p:spPr>
+        <p:txBody>
+          <a:bodyPr wrap="none" rtlCol="0">
+            <a:spAutoFit/>
+          </a:bodyPr>
+          <a:lstStyle/>
+          <a:p>
+            <a:r>
+              <a:rPr lang="de-CH" sz="1100" b="1" dirty="0" smtClean="0"/>
+              <a:t>Tesla Forum – Essentials </a:t>
+            </a:r>
+            <a:r>
+              <a:rPr lang="de-CH" sz="1100" b="1" dirty="0" smtClean="0">
+                <a:sym typeface="Wingdings" panose="05000000000000000000" pitchFamily="2" charset="2"/>
+              </a:rPr>
+              <a:t> </a:t>
+            </a:r>
+            <a:endParaRPr lang="en-US" sz="1100" b="1" dirty="0"/>
+          </a:p>
+        </p:txBody>
+      </p:sp>
     </p:spTree>
+    <p:extLst>
+      <p:ext uri="{BB962C8B-B14F-4D97-AF65-F5344CB8AC3E}">
+        <p14:creationId xmlns:p14="http://schemas.microsoft.com/office/powerpoint/2010/main" val="3644876993"/>
+      </p:ext>
+    </p:extLst>
   </p:cSld>
   <p:clrMapOvr>
     <a:masterClrMapping/>

</xml_diff>

<commit_message>
updated with information about model x
</commit_message>
<xml_diff>
--- a/tesla_model_s_handout_ch.pptx
+++ b/tesla_model_s_handout_ch.pptx
@@ -290,7 +290,7 @@
             <a:fld id="{63BB9708-3311-2149-A02D-BFA98F482279}" type="datetimeFigureOut">
               <a:rPr lang="de-DE" smtClean="0"/>
               <a:pPr/>
-              <a:t>17.04.2015</a:t>
+              <a:t>25.01.2016</a:t>
             </a:fld>
             <a:endParaRPr lang="de-DE"/>
           </a:p>
@@ -457,7 +457,7 @@
             <a:fld id="{63BB9708-3311-2149-A02D-BFA98F482279}" type="datetimeFigureOut">
               <a:rPr lang="de-DE" smtClean="0"/>
               <a:pPr/>
-              <a:t>17.04.2015</a:t>
+              <a:t>25.01.2016</a:t>
             </a:fld>
             <a:endParaRPr lang="de-DE"/>
           </a:p>
@@ -634,7 +634,7 @@
             <a:fld id="{63BB9708-3311-2149-A02D-BFA98F482279}" type="datetimeFigureOut">
               <a:rPr lang="de-DE" smtClean="0"/>
               <a:pPr/>
-              <a:t>17.04.2015</a:t>
+              <a:t>25.01.2016</a:t>
             </a:fld>
             <a:endParaRPr lang="de-DE"/>
           </a:p>
@@ -801,7 +801,7 @@
             <a:fld id="{63BB9708-3311-2149-A02D-BFA98F482279}" type="datetimeFigureOut">
               <a:rPr lang="de-DE" smtClean="0"/>
               <a:pPr/>
-              <a:t>17.04.2015</a:t>
+              <a:t>25.01.2016</a:t>
             </a:fld>
             <a:endParaRPr lang="de-DE"/>
           </a:p>
@@ -1044,7 +1044,7 @@
             <a:fld id="{63BB9708-3311-2149-A02D-BFA98F482279}" type="datetimeFigureOut">
               <a:rPr lang="de-DE" smtClean="0"/>
               <a:pPr/>
-              <a:t>17.04.2015</a:t>
+              <a:t>25.01.2016</a:t>
             </a:fld>
             <a:endParaRPr lang="de-DE"/>
           </a:p>
@@ -1329,7 +1329,7 @@
             <a:fld id="{63BB9708-3311-2149-A02D-BFA98F482279}" type="datetimeFigureOut">
               <a:rPr lang="de-DE" smtClean="0"/>
               <a:pPr/>
-              <a:t>17.04.2015</a:t>
+              <a:t>25.01.2016</a:t>
             </a:fld>
             <a:endParaRPr lang="de-DE"/>
           </a:p>
@@ -1748,7 +1748,7 @@
             <a:fld id="{63BB9708-3311-2149-A02D-BFA98F482279}" type="datetimeFigureOut">
               <a:rPr lang="de-DE" smtClean="0"/>
               <a:pPr/>
-              <a:t>17.04.2015</a:t>
+              <a:t>25.01.2016</a:t>
             </a:fld>
             <a:endParaRPr lang="de-DE"/>
           </a:p>
@@ -1863,7 +1863,7 @@
             <a:fld id="{63BB9708-3311-2149-A02D-BFA98F482279}" type="datetimeFigureOut">
               <a:rPr lang="de-DE" smtClean="0"/>
               <a:pPr/>
-              <a:t>17.04.2015</a:t>
+              <a:t>25.01.2016</a:t>
             </a:fld>
             <a:endParaRPr lang="de-DE"/>
           </a:p>
@@ -1955,7 +1955,7 @@
             <a:fld id="{63BB9708-3311-2149-A02D-BFA98F482279}" type="datetimeFigureOut">
               <a:rPr lang="de-DE" smtClean="0"/>
               <a:pPr/>
-              <a:t>17.04.2015</a:t>
+              <a:t>25.01.2016</a:t>
             </a:fld>
             <a:endParaRPr lang="de-DE"/>
           </a:p>
@@ -2229,7 +2229,7 @@
             <a:fld id="{63BB9708-3311-2149-A02D-BFA98F482279}" type="datetimeFigureOut">
               <a:rPr lang="de-DE" smtClean="0"/>
               <a:pPr/>
-              <a:t>17.04.2015</a:t>
+              <a:t>25.01.2016</a:t>
             </a:fld>
             <a:endParaRPr lang="de-DE"/>
           </a:p>
@@ -2479,7 +2479,7 @@
             <a:fld id="{63BB9708-3311-2149-A02D-BFA98F482279}" type="datetimeFigureOut">
               <a:rPr lang="de-DE" smtClean="0"/>
               <a:pPr/>
-              <a:t>17.04.2015</a:t>
+              <a:t>25.01.2016</a:t>
             </a:fld>
             <a:endParaRPr lang="de-DE"/>
           </a:p>
@@ -2689,7 +2689,7 @@
             <a:fld id="{63BB9708-3311-2149-A02D-BFA98F482279}" type="datetimeFigureOut">
               <a:rPr lang="de-DE" smtClean="0"/>
               <a:pPr/>
-              <a:t>17.04.2015</a:t>
+              <a:t>25.01.2016</a:t>
             </a:fld>
             <a:endParaRPr lang="de-DE"/>
           </a:p>
@@ -3062,6 +3062,363 @@
       </p:grpSpPr>
       <p:sp>
         <p:nvSpPr>
+          <p:cNvPr id="17" name="Rechteck 16"/>
+          <p:cNvSpPr/>
+          <p:nvPr/>
+        </p:nvSpPr>
+        <p:spPr>
+          <a:xfrm>
+            <a:off x="-9890" y="2028992"/>
+            <a:ext cx="9915891" cy="4839847"/>
+          </a:xfrm>
+          <a:prstGeom prst="rect">
+            <a:avLst/>
+          </a:prstGeom>
+          <a:solidFill>
+            <a:schemeClr val="bg1">
+              <a:lumMod val="75000"/>
+            </a:schemeClr>
+          </a:solidFill>
+          <a:ln>
+            <a:noFill/>
+          </a:ln>
+          <a:effectLst/>
+        </p:spPr>
+        <p:style>
+          <a:lnRef idx="1">
+            <a:schemeClr val="accent1"/>
+          </a:lnRef>
+          <a:fillRef idx="3">
+            <a:schemeClr val="accent1"/>
+          </a:fillRef>
+          <a:effectRef idx="2">
+            <a:schemeClr val="accent1"/>
+          </a:effectRef>
+          <a:fontRef idx="minor">
+            <a:schemeClr val="lt1"/>
+          </a:fontRef>
+        </p:style>
+        <p:txBody>
+          <a:bodyPr rtlCol="0" anchor="ctr"/>
+          <a:lstStyle/>
+          <a:p>
+            <a:pPr algn="ctr"/>
+            <a:endParaRPr lang="en-US"/>
+          </a:p>
+        </p:txBody>
+      </p:sp>
+      <p:sp>
+        <p:nvSpPr>
+          <p:cNvPr id="16" name="Rechteck 15"/>
+          <p:cNvSpPr/>
+          <p:nvPr/>
+        </p:nvSpPr>
+        <p:spPr>
+          <a:xfrm>
+            <a:off x="-9890" y="2254651"/>
+            <a:ext cx="2842185" cy="2856843"/>
+          </a:xfrm>
+          <a:prstGeom prst="rect">
+            <a:avLst/>
+          </a:prstGeom>
+          <a:solidFill>
+            <a:schemeClr val="bg1"/>
+          </a:solidFill>
+          <a:ln>
+            <a:noFill/>
+          </a:ln>
+        </p:spPr>
+        <p:style>
+          <a:lnRef idx="1">
+            <a:schemeClr val="accent1"/>
+          </a:lnRef>
+          <a:fillRef idx="3">
+            <a:schemeClr val="accent1"/>
+          </a:fillRef>
+          <a:effectRef idx="2">
+            <a:schemeClr val="accent1"/>
+          </a:effectRef>
+          <a:fontRef idx="minor">
+            <a:schemeClr val="lt1"/>
+          </a:fontRef>
+        </p:style>
+        <p:txBody>
+          <a:bodyPr rtlCol="0" anchor="ctr"/>
+          <a:lstStyle/>
+          <a:p>
+            <a:pPr algn="ctr"/>
+            <a:endParaRPr lang="de-CH" dirty="0" smtClean="0">
+              <a:solidFill>
+                <a:schemeClr val="tx1"/>
+              </a:solidFill>
+            </a:endParaRPr>
+          </a:p>
+          <a:p>
+            <a:pPr algn="ctr"/>
+            <a:endParaRPr lang="de-CH" dirty="0">
+              <a:solidFill>
+                <a:schemeClr val="tx1"/>
+              </a:solidFill>
+            </a:endParaRPr>
+          </a:p>
+          <a:p>
+            <a:pPr algn="ctr"/>
+            <a:endParaRPr lang="de-CH" dirty="0" smtClean="0">
+              <a:solidFill>
+                <a:schemeClr val="tx1"/>
+              </a:solidFill>
+            </a:endParaRPr>
+          </a:p>
+          <a:p>
+            <a:pPr algn="ctr"/>
+            <a:endParaRPr lang="de-CH" dirty="0">
+              <a:solidFill>
+                <a:schemeClr val="tx1"/>
+              </a:solidFill>
+            </a:endParaRPr>
+          </a:p>
+          <a:p>
+            <a:pPr algn="ctr"/>
+            <a:endParaRPr lang="de-CH" dirty="0" smtClean="0">
+              <a:solidFill>
+                <a:schemeClr val="tx1"/>
+              </a:solidFill>
+            </a:endParaRPr>
+          </a:p>
+          <a:p>
+            <a:pPr algn="ctr"/>
+            <a:r>
+              <a:rPr lang="de-CH" dirty="0" smtClean="0">
+                <a:solidFill>
+                  <a:schemeClr val="bg1">
+                    <a:lumMod val="50000"/>
+                  </a:schemeClr>
+                </a:solidFill>
+              </a:rPr>
+              <a:t>…</a:t>
+            </a:r>
+            <a:endParaRPr lang="en-US" dirty="0">
+              <a:solidFill>
+                <a:schemeClr val="bg1">
+                  <a:lumMod val="50000"/>
+                </a:schemeClr>
+              </a:solidFill>
+            </a:endParaRPr>
+          </a:p>
+        </p:txBody>
+      </p:sp>
+      <p:pic>
+        <p:nvPicPr>
+          <p:cNvPr id="13" name="Picture 3"/>
+          <p:cNvPicPr>
+            <a:picLocks noChangeAspect="1" noChangeArrowheads="1"/>
+          </p:cNvPicPr>
+          <p:nvPr/>
+        </p:nvPicPr>
+        <p:blipFill rotWithShape="1">
+          <a:blip r:embed="rId2">
+            <a:extLst>
+              <a:ext uri="{28A0092B-C50C-407E-A947-70E740481C1C}">
+                <a14:useLocalDpi xmlns:a14="http://schemas.microsoft.com/office/drawing/2010/main" val="0"/>
+              </a:ext>
+            </a:extLst>
+          </a:blip>
+          <a:srcRect l="6013" r="6404" b="2091"/>
+          <a:stretch/>
+        </p:blipFill>
+        <p:spPr bwMode="auto">
+          <a:xfrm>
+            <a:off x="1548618" y="2282847"/>
+            <a:ext cx="1283677" cy="2751568"/>
+          </a:xfrm>
+          <a:prstGeom prst="rect">
+            <a:avLst/>
+          </a:prstGeom>
+          <a:noFill/>
+          <a:ln>
+            <a:noFill/>
+          </a:ln>
+          <a:extLst>
+            <a:ext uri="{909E8E84-426E-40DD-AFC4-6F175D3DCCD1}">
+              <a14:hiddenFill xmlns:a14="http://schemas.microsoft.com/office/drawing/2010/main">
+                <a:solidFill>
+                  <a:schemeClr val="accent1"/>
+                </a:solidFill>
+              </a14:hiddenFill>
+            </a:ext>
+            <a:ext uri="{91240B29-F687-4F45-9708-019B960494DF}">
+              <a14:hiddenLine xmlns:a14="http://schemas.microsoft.com/office/drawing/2010/main" w="9525">
+                <a:solidFill>
+                  <a:schemeClr val="tx1"/>
+                </a:solidFill>
+                <a:miter lim="800000"/>
+                <a:headEnd/>
+                <a:tailEnd/>
+              </a14:hiddenLine>
+            </a:ext>
+          </a:extLst>
+        </p:spPr>
+      </p:pic>
+      <p:pic>
+        <p:nvPicPr>
+          <p:cNvPr id="1029" name="Picture 5"/>
+          <p:cNvPicPr>
+            <a:picLocks noChangeAspect="1" noChangeArrowheads="1"/>
+          </p:cNvPicPr>
+          <p:nvPr/>
+        </p:nvPicPr>
+        <p:blipFill rotWithShape="1">
+          <a:blip r:embed="rId3">
+            <a:extLst>
+              <a:ext uri="{28A0092B-C50C-407E-A947-70E740481C1C}">
+                <a14:useLocalDpi xmlns:a14="http://schemas.microsoft.com/office/drawing/2010/main" val="0"/>
+              </a:ext>
+            </a:extLst>
+          </a:blip>
+          <a:srcRect l="7468" t="1" r="4688" b="2584"/>
+          <a:stretch/>
+        </p:blipFill>
+        <p:spPr bwMode="auto">
+          <a:xfrm>
+            <a:off x="1560986" y="2717799"/>
+            <a:ext cx="1271309" cy="2316615"/>
+          </a:xfrm>
+          <a:prstGeom prst="rect">
+            <a:avLst/>
+          </a:prstGeom>
+          <a:noFill/>
+          <a:ln>
+            <a:noFill/>
+          </a:ln>
+          <a:extLst>
+            <a:ext uri="{909E8E84-426E-40DD-AFC4-6F175D3DCCD1}">
+              <a14:hiddenFill xmlns:a14="http://schemas.microsoft.com/office/drawing/2010/main">
+                <a:solidFill>
+                  <a:schemeClr val="accent1"/>
+                </a:solidFill>
+              </a14:hiddenFill>
+            </a:ext>
+            <a:ext uri="{91240B29-F687-4F45-9708-019B960494DF}">
+              <a14:hiddenLine xmlns:a14="http://schemas.microsoft.com/office/drawing/2010/main" w="9525">
+                <a:solidFill>
+                  <a:schemeClr val="tx1"/>
+                </a:solidFill>
+                <a:miter lim="800000"/>
+                <a:headEnd/>
+                <a:tailEnd/>
+              </a14:hiddenLine>
+            </a:ext>
+          </a:extLst>
+        </p:spPr>
+      </p:pic>
+      <p:pic>
+        <p:nvPicPr>
+          <p:cNvPr id="1028" name="Picture 4"/>
+          <p:cNvPicPr>
+            <a:picLocks noChangeAspect="1" noChangeArrowheads="1"/>
+          </p:cNvPicPr>
+          <p:nvPr/>
+        </p:nvPicPr>
+        <p:blipFill>
+          <a:blip r:embed="rId4">
+            <a:extLst>
+              <a:ext uri="{28A0092B-C50C-407E-A947-70E740481C1C}">
+                <a14:useLocalDpi xmlns:a14="http://schemas.microsoft.com/office/drawing/2010/main" val="0"/>
+              </a:ext>
+            </a:extLst>
+          </a:blip>
+          <a:srcRect/>
+          <a:stretch>
+            <a:fillRect/>
+          </a:stretch>
+        </p:blipFill>
+        <p:spPr bwMode="auto">
+          <a:xfrm>
+            <a:off x="2883489" y="2254651"/>
+            <a:ext cx="1880410" cy="2907524"/>
+          </a:xfrm>
+          <a:prstGeom prst="rect">
+            <a:avLst/>
+          </a:prstGeom>
+          <a:noFill/>
+          <a:ln>
+            <a:noFill/>
+          </a:ln>
+          <a:extLst>
+            <a:ext uri="{909E8E84-426E-40DD-AFC4-6F175D3DCCD1}">
+              <a14:hiddenFill xmlns:a14="http://schemas.microsoft.com/office/drawing/2010/main">
+                <a:solidFill>
+                  <a:schemeClr val="accent1"/>
+                </a:solidFill>
+              </a14:hiddenFill>
+            </a:ext>
+            <a:ext uri="{91240B29-F687-4F45-9708-019B960494DF}">
+              <a14:hiddenLine xmlns:a14="http://schemas.microsoft.com/office/drawing/2010/main" w="9525">
+                <a:solidFill>
+                  <a:schemeClr val="tx1"/>
+                </a:solidFill>
+                <a:miter lim="800000"/>
+                <a:headEnd/>
+                <a:tailEnd/>
+              </a14:hiddenLine>
+            </a:ext>
+          </a:extLst>
+        </p:spPr>
+      </p:pic>
+      <p:pic>
+        <p:nvPicPr>
+          <p:cNvPr id="4" name="Picture 2"/>
+          <p:cNvPicPr>
+            <a:picLocks noChangeAspect="1" noChangeArrowheads="1"/>
+          </p:cNvPicPr>
+          <p:nvPr/>
+        </p:nvPicPr>
+        <p:blipFill rotWithShape="1">
+          <a:blip r:embed="rId5">
+            <a:extLst>
+              <a:ext uri="{28A0092B-C50C-407E-A947-70E740481C1C}">
+                <a14:useLocalDpi xmlns:a14="http://schemas.microsoft.com/office/drawing/2010/main" val="0"/>
+              </a:ext>
+            </a:extLst>
+          </a:blip>
+          <a:srcRect l="5286" r="7216" b="554"/>
+          <a:stretch/>
+        </p:blipFill>
+        <p:spPr bwMode="auto">
+          <a:xfrm>
+            <a:off x="662" y="2286745"/>
+            <a:ext cx="1261328" cy="2747669"/>
+          </a:xfrm>
+          <a:prstGeom prst="rect">
+            <a:avLst/>
+          </a:prstGeom>
+          <a:noFill/>
+          <a:ln>
+            <a:noFill/>
+          </a:ln>
+          <a:extLst>
+            <a:ext uri="{909E8E84-426E-40DD-AFC4-6F175D3DCCD1}">
+              <a14:hiddenFill xmlns:a14="http://schemas.microsoft.com/office/drawing/2010/main">
+                <a:solidFill>
+                  <a:schemeClr val="accent1"/>
+                </a:solidFill>
+              </a14:hiddenFill>
+            </a:ext>
+            <a:ext uri="{91240B29-F687-4F45-9708-019B960494DF}">
+              <a14:hiddenLine xmlns:a14="http://schemas.microsoft.com/office/drawing/2010/main" w="9525">
+                <a:solidFill>
+                  <a:schemeClr val="tx1"/>
+                </a:solidFill>
+                <a:miter lim="800000"/>
+                <a:headEnd/>
+                <a:tailEnd/>
+              </a14:hiddenLine>
+            </a:ext>
+          </a:extLst>
+        </p:spPr>
+      </p:pic>
+      <p:sp>
+        <p:nvSpPr>
           <p:cNvPr id="2" name="Rechteck 1"/>
           <p:cNvSpPr/>
           <p:nvPr/>
@@ -3107,53 +3464,6 @@
           </a:p>
         </p:txBody>
       </p:sp>
-      <p:sp>
-        <p:nvSpPr>
-          <p:cNvPr id="17" name="Rechteck 16"/>
-          <p:cNvSpPr/>
-          <p:nvPr/>
-        </p:nvSpPr>
-        <p:spPr>
-          <a:xfrm>
-            <a:off x="3744686" y="2028992"/>
-            <a:ext cx="6161315" cy="4839847"/>
-          </a:xfrm>
-          <a:prstGeom prst="rect">
-            <a:avLst/>
-          </a:prstGeom>
-          <a:solidFill>
-            <a:schemeClr val="bg1">
-              <a:lumMod val="75000"/>
-            </a:schemeClr>
-          </a:solidFill>
-          <a:ln>
-            <a:noFill/>
-          </a:ln>
-          <a:effectLst/>
-        </p:spPr>
-        <p:style>
-          <a:lnRef idx="1">
-            <a:schemeClr val="accent1"/>
-          </a:lnRef>
-          <a:fillRef idx="3">
-            <a:schemeClr val="accent1"/>
-          </a:fillRef>
-          <a:effectRef idx="2">
-            <a:schemeClr val="accent1"/>
-          </a:effectRef>
-          <a:fontRef idx="minor">
-            <a:schemeClr val="lt1"/>
-          </a:fontRef>
-        </p:style>
-        <p:txBody>
-          <a:bodyPr rtlCol="0" anchor="ctr"/>
-          <a:lstStyle/>
-          <a:p>
-            <a:pPr algn="ctr"/>
-            <a:endParaRPr lang="en-US"/>
-          </a:p>
-        </p:txBody>
-      </p:sp>
       <p:pic>
         <p:nvPicPr>
           <p:cNvPr id="3" name="Grafik 2"/>
@@ -3163,7 +3473,7 @@
           <p:nvPr/>
         </p:nvPicPr>
         <p:blipFill rotWithShape="1">
-          <a:blip r:embed="rId2" cstate="print">
+          <a:blip r:embed="rId6" cstate="print">
             <a:extLst>
               <a:ext uri="{28A0092B-C50C-407E-A947-70E740481C1C}">
                 <a14:useLocalDpi xmlns:a14="http://schemas.microsoft.com/office/drawing/2010/main"/>
@@ -3331,7 +3641,7 @@
           <p:nvPr/>
         </p:nvPicPr>
         <p:blipFill rotWithShape="1">
-          <a:blip r:embed="rId3" cstate="print">
+          <a:blip r:embed="rId7" cstate="print">
             <a:extLst>
               <a:ext uri="{28A0092B-C50C-407E-A947-70E740481C1C}">
                 <a14:useLocalDpi xmlns:a14="http://schemas.microsoft.com/office/drawing/2010/main"/>
@@ -3459,11 +3769,8 @@
                   </a:outerShdw>
                 </a:effectLst>
               </a:rPr>
-              <a:t>Stand: April 2015</a:t>
-            </a:r>
-          </a:p>
-          <a:p>
-            <a:pPr algn="r"/>
+              <a:t>Stand: </a:t>
+            </a:r>
             <a:r>
               <a:rPr lang="de-CH" sz="1200" b="1" dirty="0" smtClean="0">
                 <a:ln w="18415" cmpd="sng">
@@ -3481,8 +3788,81 @@
                   </a:outerShdw>
                 </a:effectLst>
               </a:rPr>
-              <a:t>Version 1.5</a:t>
-            </a:r>
+              <a:t>Januar 2016</a:t>
+            </a:r>
+            <a:endParaRPr lang="de-CH" sz="1200" b="1" dirty="0" smtClean="0">
+              <a:ln w="18415" cmpd="sng">
+                <a:noFill/>
+                <a:prstDash val="solid"/>
+              </a:ln>
+              <a:solidFill>
+                <a:srgbClr val="FFFFFF"/>
+              </a:solidFill>
+              <a:effectLst>
+                <a:outerShdw blurRad="38100" dist="38100" dir="2700000" algn="tl">
+                  <a:srgbClr val="000000">
+                    <a:alpha val="43137"/>
+                  </a:srgbClr>
+                </a:outerShdw>
+              </a:effectLst>
+            </a:endParaRPr>
+          </a:p>
+          <a:p>
+            <a:pPr algn="r"/>
+            <a:r>
+              <a:rPr lang="de-CH" sz="1200" b="1" dirty="0" smtClean="0">
+                <a:ln w="18415" cmpd="sng">
+                  <a:noFill/>
+                  <a:prstDash val="solid"/>
+                </a:ln>
+                <a:solidFill>
+                  <a:srgbClr val="FFFFFF"/>
+                </a:solidFill>
+                <a:effectLst>
+                  <a:outerShdw blurRad="38100" dist="38100" dir="2700000" algn="tl">
+                    <a:srgbClr val="000000">
+                      <a:alpha val="43137"/>
+                    </a:srgbClr>
+                  </a:outerShdw>
+                </a:effectLst>
+              </a:rPr>
+              <a:t>Version </a:t>
+            </a:r>
+            <a:r>
+              <a:rPr lang="de-CH" sz="1200" b="1" dirty="0" smtClean="0">
+                <a:ln w="18415" cmpd="sng">
+                  <a:noFill/>
+                  <a:prstDash val="solid"/>
+                </a:ln>
+                <a:solidFill>
+                  <a:srgbClr val="FFFFFF"/>
+                </a:solidFill>
+                <a:effectLst>
+                  <a:outerShdw blurRad="38100" dist="38100" dir="2700000" algn="tl">
+                    <a:srgbClr val="000000">
+                      <a:alpha val="43137"/>
+                    </a:srgbClr>
+                  </a:outerShdw>
+                </a:effectLst>
+              </a:rPr>
+              <a:t>1.6</a:t>
+            </a:r>
+            <a:endParaRPr lang="de-CH" sz="1200" b="1" dirty="0" smtClean="0">
+              <a:ln w="18415" cmpd="sng">
+                <a:noFill/>
+                <a:prstDash val="solid"/>
+              </a:ln>
+              <a:solidFill>
+                <a:srgbClr val="FFFFFF"/>
+              </a:solidFill>
+              <a:effectLst>
+                <a:outerShdw blurRad="38100" dist="38100" dir="2700000" algn="tl">
+                  <a:srgbClr val="000000">
+                    <a:alpha val="43137"/>
+                  </a:srgbClr>
+                </a:outerShdw>
+              </a:effectLst>
+            </a:endParaRPr>
           </a:p>
           <a:p>
             <a:pPr algn="r"/>
@@ -3562,7 +3942,7 @@
           <p:nvPr/>
         </p:nvPicPr>
         <p:blipFill>
-          <a:blip r:embed="rId4" cstate="print">
+          <a:blip r:embed="rId8" cstate="print">
             <a:extLst>
               <a:ext uri="{28A0092B-C50C-407E-A947-70E740481C1C}">
                 <a14:useLocalDpi xmlns:a14="http://schemas.microsoft.com/office/drawing/2010/main"/>
@@ -3616,7 +3996,7 @@
           <p:nvPr/>
         </p:nvPicPr>
         <p:blipFill rotWithShape="1">
-          <a:blip r:embed="rId5" cstate="print">
+          <a:blip r:embed="rId9" cstate="print">
             <a:extLst>
               <a:ext uri="{28A0092B-C50C-407E-A947-70E740481C1C}">
                 <a14:useLocalDpi xmlns:a14="http://schemas.microsoft.com/office/drawing/2010/main"/>
@@ -3657,7 +4037,7 @@
           <p:nvPr/>
         </p:nvPicPr>
         <p:blipFill>
-          <a:blip r:embed="rId6" cstate="print">
+          <a:blip r:embed="rId10" cstate="print">
             <a:extLst>
               <a:ext uri="{28A0092B-C50C-407E-A947-70E740481C1C}">
                 <a14:useLocalDpi xmlns:a14="http://schemas.microsoft.com/office/drawing/2010/main"/>
@@ -3711,7 +4091,7 @@
           <p:nvPr/>
         </p:nvPicPr>
         <p:blipFill>
-          <a:blip r:embed="rId7" cstate="print">
+          <a:blip r:embed="rId11" cstate="print">
             <a:extLst>
               <a:ext uri="{28A0092B-C50C-407E-A947-70E740481C1C}">
                 <a14:useLocalDpi xmlns:a14="http://schemas.microsoft.com/office/drawing/2010/main"/>
@@ -3799,7 +4179,7 @@
           <p:nvPr/>
         </p:nvPicPr>
         <p:blipFill rotWithShape="1">
-          <a:blip r:embed="rId8" cstate="print">
+          <a:blip r:embed="rId12" cstate="print">
             <a:extLst>
               <a:ext uri="{28A0092B-C50C-407E-A947-70E740481C1C}">
                 <a14:useLocalDpi xmlns:a14="http://schemas.microsoft.com/office/drawing/2010/main"/>
@@ -3885,7 +4265,7 @@
           <p:nvPr/>
         </p:nvPicPr>
         <p:blipFill>
-          <a:blip r:embed="rId9" cstate="print">
+          <a:blip r:embed="rId13" cstate="print">
             <a:extLst>
               <a:ext uri="{28A0092B-C50C-407E-A947-70E740481C1C}">
                 <a14:useLocalDpi xmlns:a14="http://schemas.microsoft.com/office/drawing/2010/main"/>
@@ -3939,7 +4319,7 @@
           <p:nvPr/>
         </p:nvPicPr>
         <p:blipFill>
-          <a:blip r:embed="rId10">
+          <a:blip r:embed="rId14">
             <a:extLst>
               <a:ext uri="{28A0092B-C50C-407E-A947-70E740481C1C}">
                 <a14:useLocalDpi xmlns:a14="http://schemas.microsoft.com/office/drawing/2010/main" val="0"/>
@@ -3988,60 +4368,6 @@
       </p:pic>
       <p:pic>
         <p:nvPicPr>
-          <p:cNvPr id="8" name="Picture 2"/>
-          <p:cNvPicPr>
-            <a:picLocks noChangeAspect="1" noChangeArrowheads="1"/>
-          </p:cNvPicPr>
-          <p:nvPr/>
-        </p:nvPicPr>
-        <p:blipFill>
-          <a:blip r:embed="rId11">
-            <a:extLst>
-              <a:ext uri="{28A0092B-C50C-407E-A947-70E740481C1C}">
-                <a14:useLocalDpi xmlns:a14="http://schemas.microsoft.com/office/drawing/2010/main"/>
-              </a:ext>
-            </a:extLst>
-          </a:blip>
-          <a:srcRect/>
-          <a:stretch>
-            <a:fillRect/>
-          </a:stretch>
-        </p:blipFill>
-        <p:spPr bwMode="auto">
-          <a:xfrm>
-            <a:off x="-9889" y="2225317"/>
-            <a:ext cx="4528748" cy="2886177"/>
-          </a:xfrm>
-          <a:prstGeom prst="rect">
-            <a:avLst/>
-          </a:prstGeom>
-          <a:noFill/>
-          <a:ln>
-            <a:noFill/>
-          </a:ln>
-          <a:extLst>
-            <a:ext uri="{909E8E84-426E-40DD-AFC4-6F175D3DCCD1}">
-              <a14:hiddenFill xmlns:a14="http://schemas.microsoft.com/office/drawing/2010/main">
-                <a:solidFill>
-                  <a:schemeClr val="accent1"/>
-                </a:solidFill>
-              </a14:hiddenFill>
-            </a:ext>
-            <a:ext uri="{91240B29-F687-4F45-9708-019B960494DF}">
-              <a14:hiddenLine xmlns:a14="http://schemas.microsoft.com/office/drawing/2010/main" w="9525">
-                <a:solidFill>
-                  <a:schemeClr val="tx1"/>
-                </a:solidFill>
-                <a:miter lim="800000"/>
-                <a:headEnd/>
-                <a:tailEnd/>
-              </a14:hiddenLine>
-            </a:ext>
-          </a:extLst>
-        </p:spPr>
-      </p:pic>
-      <p:pic>
-        <p:nvPicPr>
           <p:cNvPr id="1026" name="Picture 2"/>
           <p:cNvPicPr>
             <a:picLocks noChangeAspect="1" noChangeArrowheads="1"/>
@@ -4049,7 +4375,7 @@
           <p:nvPr/>
         </p:nvPicPr>
         <p:blipFill rotWithShape="1">
-          <a:blip r:embed="rId12" cstate="print">
+          <a:blip r:embed="rId15" cstate="print">
             <a:extLst>
               <a:ext uri="{28A0092B-C50C-407E-A947-70E740481C1C}">
                 <a14:useLocalDpi xmlns:a14="http://schemas.microsoft.com/office/drawing/2010/main"/>
@@ -4673,7 +4999,7 @@
         <p:spPr>
           <a:xfrm>
             <a:off x="-9889" y="2225317"/>
-            <a:ext cx="697408" cy="169277"/>
+            <a:ext cx="690996" cy="169277"/>
           </a:xfrm>
           <a:prstGeom prst="rect">
             <a:avLst/>
@@ -4692,7 +5018,7 @@
           <a:p>
             <a:r>
               <a:rPr lang="de-CH" sz="1100" b="1" i="1" dirty="0" smtClean="0"/>
-              <a:t>Modelle</a:t>
+              <a:t>Model S</a:t>
             </a:r>
             <a:endParaRPr lang="en-US" sz="1100" b="1" i="1" dirty="0"/>
           </a:p>
@@ -4732,16 +5058,256 @@
           </a:p>
         </p:txBody>
       </p:sp>
+      <p:sp>
+        <p:nvSpPr>
+          <p:cNvPr id="11" name="Textfeld 10"/>
+          <p:cNvSpPr txBox="1"/>
+          <p:nvPr/>
+        </p:nvSpPr>
+        <p:spPr>
+          <a:xfrm>
+            <a:off x="210946" y="4780498"/>
+            <a:ext cx="840295" cy="261610"/>
+          </a:xfrm>
+          <a:prstGeom prst="rect">
+            <a:avLst/>
+          </a:prstGeom>
+          <a:noFill/>
+        </p:spPr>
+        <p:txBody>
+          <a:bodyPr wrap="none" rtlCol="0">
+            <a:spAutoFit/>
+          </a:bodyPr>
+          <a:lstStyle/>
+          <a:p>
+            <a:r>
+              <a:rPr lang="de-CH" sz="1050" dirty="0" smtClean="0"/>
+              <a:t>CHF 74’500</a:t>
+            </a:r>
+            <a:endParaRPr lang="en-US" sz="1050" dirty="0"/>
+          </a:p>
+        </p:txBody>
+      </p:sp>
+      <p:sp>
+        <p:nvSpPr>
+          <p:cNvPr id="35" name="Textfeld 34"/>
+          <p:cNvSpPr txBox="1"/>
+          <p:nvPr/>
+        </p:nvSpPr>
+        <p:spPr>
+          <a:xfrm>
+            <a:off x="1660046" y="4780498"/>
+            <a:ext cx="880369" cy="253916"/>
+          </a:xfrm>
+          <a:prstGeom prst="rect">
+            <a:avLst/>
+          </a:prstGeom>
+          <a:noFill/>
+        </p:spPr>
+        <p:txBody>
+          <a:bodyPr wrap="none" rtlCol="0">
+            <a:spAutoFit/>
+          </a:bodyPr>
+          <a:lstStyle/>
+          <a:p>
+            <a:r>
+              <a:rPr lang="de-CH" sz="1050" dirty="0" smtClean="0"/>
+              <a:t>CHF 139’500</a:t>
+            </a:r>
+            <a:endParaRPr lang="en-US" sz="1050" dirty="0"/>
+          </a:p>
+        </p:txBody>
+      </p:sp>
+      <p:sp>
+        <p:nvSpPr>
+          <p:cNvPr id="36" name="Textfeld 35"/>
+          <p:cNvSpPr txBox="1"/>
+          <p:nvPr/>
+        </p:nvSpPr>
+        <p:spPr>
+          <a:xfrm>
+            <a:off x="2787307" y="2225317"/>
+            <a:ext cx="702216" cy="169277"/>
+          </a:xfrm>
+          <a:prstGeom prst="rect">
+            <a:avLst/>
+          </a:prstGeom>
+          <a:solidFill>
+            <a:srgbClr val="000099">
+              <a:alpha val="45098"/>
+            </a:srgbClr>
+          </a:solidFill>
+        </p:spPr>
+        <p:txBody>
+          <a:bodyPr wrap="none" lIns="108000" tIns="0" rIns="108000" bIns="0" rtlCol="0">
+            <a:spAutoFit/>
+          </a:bodyPr>
+          <a:lstStyle/>
+          <a:p>
+            <a:r>
+              <a:rPr lang="de-CH" sz="1100" b="1" i="1" dirty="0" smtClean="0"/>
+              <a:t>Model X</a:t>
+            </a:r>
+            <a:endParaRPr lang="en-US" sz="1100" b="1" i="1" dirty="0"/>
+          </a:p>
+        </p:txBody>
+      </p:sp>
+      <p:sp>
+        <p:nvSpPr>
+          <p:cNvPr id="18" name="Textfeld 17"/>
+          <p:cNvSpPr txBox="1"/>
+          <p:nvPr/>
+        </p:nvSpPr>
+        <p:spPr>
+          <a:xfrm>
+            <a:off x="29718" y="4241166"/>
+            <a:ext cx="1183369" cy="415498"/>
+          </a:xfrm>
+          <a:prstGeom prst="rect">
+            <a:avLst/>
+          </a:prstGeom>
+          <a:noFill/>
+        </p:spPr>
+        <p:txBody>
+          <a:bodyPr wrap="square" rtlCol="0">
+            <a:spAutoFit/>
+          </a:bodyPr>
+          <a:lstStyle/>
+          <a:p>
+            <a:pPr algn="ctr"/>
+            <a:r>
+              <a:rPr lang="de-CH" sz="1050" dirty="0" smtClean="0">
+                <a:solidFill>
+                  <a:schemeClr val="bg1">
+                    <a:lumMod val="50000"/>
+                  </a:schemeClr>
+                </a:solidFill>
+              </a:rPr>
+              <a:t>Basismodell </a:t>
+            </a:r>
+            <a:r>
+              <a:rPr lang="en-US" sz="1050" dirty="0" err="1" smtClean="0">
+                <a:solidFill>
+                  <a:schemeClr val="bg1">
+                    <a:lumMod val="50000"/>
+                  </a:schemeClr>
+                </a:solidFill>
+              </a:rPr>
+              <a:t>mit</a:t>
+            </a:r>
+            <a:r>
+              <a:rPr lang="en-US" sz="1050" dirty="0" smtClean="0">
+                <a:solidFill>
+                  <a:schemeClr val="bg1">
+                    <a:lumMod val="50000"/>
+                  </a:schemeClr>
+                </a:solidFill>
+              </a:rPr>
+              <a:t> </a:t>
+            </a:r>
+            <a:r>
+              <a:rPr lang="en-US" sz="1050" dirty="0" err="1" smtClean="0">
+                <a:solidFill>
+                  <a:schemeClr val="bg1">
+                    <a:lumMod val="50000"/>
+                  </a:schemeClr>
+                </a:solidFill>
+              </a:rPr>
+              <a:t>Grundausstattung</a:t>
+            </a:r>
+            <a:endParaRPr lang="de-CH" sz="1050" dirty="0" smtClean="0">
+              <a:solidFill>
+                <a:schemeClr val="bg1">
+                  <a:lumMod val="50000"/>
+                </a:schemeClr>
+              </a:solidFill>
+            </a:endParaRPr>
+          </a:p>
+        </p:txBody>
+      </p:sp>
+      <p:sp>
+        <p:nvSpPr>
+          <p:cNvPr id="45" name="Textfeld 44"/>
+          <p:cNvSpPr txBox="1"/>
+          <p:nvPr/>
+        </p:nvSpPr>
+        <p:spPr>
+          <a:xfrm>
+            <a:off x="1604955" y="4241166"/>
+            <a:ext cx="1183369" cy="415498"/>
+          </a:xfrm>
+          <a:prstGeom prst="rect">
+            <a:avLst/>
+          </a:prstGeom>
+          <a:noFill/>
+        </p:spPr>
+        <p:txBody>
+          <a:bodyPr wrap="square" rtlCol="0">
+            <a:spAutoFit/>
+          </a:bodyPr>
+          <a:lstStyle/>
+          <a:p>
+            <a:pPr algn="ctr"/>
+            <a:r>
+              <a:rPr lang="de-CH" sz="1050" dirty="0" smtClean="0">
+                <a:solidFill>
+                  <a:schemeClr val="bg1">
+                    <a:lumMod val="50000"/>
+                  </a:schemeClr>
+                </a:solidFill>
+              </a:rPr>
+              <a:t>Topmodell </a:t>
+            </a:r>
+            <a:r>
+              <a:rPr lang="en-US" sz="1050" dirty="0" err="1" smtClean="0">
+                <a:solidFill>
+                  <a:schemeClr val="bg1">
+                    <a:lumMod val="50000"/>
+                  </a:schemeClr>
+                </a:solidFill>
+              </a:rPr>
+              <a:t>mit</a:t>
+            </a:r>
+            <a:r>
+              <a:rPr lang="en-US" sz="1050" dirty="0" smtClean="0">
+                <a:solidFill>
+                  <a:schemeClr val="bg1">
+                    <a:lumMod val="50000"/>
+                  </a:schemeClr>
+                </a:solidFill>
+              </a:rPr>
+              <a:t> </a:t>
+            </a:r>
+            <a:r>
+              <a:rPr lang="en-US" sz="1050" dirty="0" err="1" smtClean="0">
+                <a:solidFill>
+                  <a:schemeClr val="bg1">
+                    <a:lumMod val="50000"/>
+                  </a:schemeClr>
+                </a:solidFill>
+              </a:rPr>
+              <a:t>Vollausstattung</a:t>
+            </a:r>
+            <a:endParaRPr lang="de-CH" sz="1050" dirty="0" smtClean="0">
+              <a:solidFill>
+                <a:schemeClr val="bg1">
+                  <a:lumMod val="50000"/>
+                </a:schemeClr>
+              </a:solidFill>
+            </a:endParaRPr>
+          </a:p>
+        </p:txBody>
+      </p:sp>
       <p:pic>
         <p:nvPicPr>
-          <p:cNvPr id="6" name="Picture 3"/>
+          <p:cNvPr id="1030" name="Picture 6"/>
           <p:cNvPicPr>
             <a:picLocks noChangeAspect="1" noChangeArrowheads="1"/>
           </p:cNvPicPr>
           <p:nvPr/>
         </p:nvPicPr>
         <p:blipFill>
-          <a:blip r:embed="rId13">
+          <a:blip r:embed="rId16">
             <a:extLst>
               <a:ext uri="{28A0092B-C50C-407E-A947-70E740481C1C}">
                 <a14:useLocalDpi xmlns:a14="http://schemas.microsoft.com/office/drawing/2010/main" val="0"/>
@@ -4755,8 +5321,8 @@
         </p:blipFill>
         <p:spPr bwMode="auto">
           <a:xfrm>
-            <a:off x="1235012" y="5177280"/>
-            <a:ext cx="3190683" cy="1588740"/>
+            <a:off x="1231927" y="5197387"/>
+            <a:ext cx="3206881" cy="1560682"/>
           </a:xfrm>
           <a:prstGeom prst="rect">
             <a:avLst/>
@@ -5445,15 +6011,7 @@
                             <a:schemeClr val="tx1"/>
                           </a:solidFill>
                         </a:rPr>
-                        <a:t> </a:t>
-                      </a:r>
-                      <a:r>
-                        <a:rPr lang="de-CH" sz="700" baseline="0" dirty="0" smtClean="0">
-                          <a:solidFill>
-                            <a:schemeClr val="tx1"/>
-                          </a:solidFill>
-                        </a:rPr>
-                        <a:t>- 1500 </a:t>
+                        <a:t> - 1500 </a:t>
                       </a:r>
                       <a:br>
                         <a:rPr lang="de-CH" sz="700" baseline="0" dirty="0" smtClean="0">
@@ -5718,15 +6276,7 @@
                             <a:schemeClr val="tx1"/>
                           </a:solidFill>
                         </a:rPr>
-                        <a:t>(</a:t>
-                      </a:r>
-                      <a:r>
-                        <a:rPr lang="de-CH" sz="700" dirty="0" smtClean="0">
-                          <a:solidFill>
-                            <a:schemeClr val="tx1"/>
-                          </a:solidFill>
-                        </a:rPr>
-                        <a:t>im Auto-Kaufpreis</a:t>
+                        <a:t>(im Auto-Kaufpreis</a:t>
                       </a:r>
                       <a:r>
                         <a:rPr lang="de-CH" sz="700" baseline="0" dirty="0" smtClean="0">
@@ -7004,17 +7554,7 @@
                   </a:schemeClr>
                 </a:solidFill>
               </a:rPr>
-              <a:t>Handout</a:t>
-            </a:r>
-            <a:r>
-              <a:rPr lang="en-US" sz="700" i="1" dirty="0" smtClean="0">
-                <a:solidFill>
-                  <a:schemeClr val="bg1">
-                    <a:lumMod val="50000"/>
-                  </a:schemeClr>
-                </a:solidFill>
-              </a:rPr>
-              <a:t>:</a:t>
+              <a:t>Handout:</a:t>
             </a:r>
             <a:endParaRPr lang="en-US" sz="700" dirty="0"/>
           </a:p>

</xml_diff>